<commit_message>
updating messy data materials
</commit_message>
<xml_diff>
--- a/1_basic_graphs_pandas/python_data_vis_1.pptx
+++ b/1_basic_graphs_pandas/python_data_vis_1.pptx
@@ -45,7 +45,7 @@
 <file path=ppt/revisionInfo.xml><?xml version="1.0" encoding="utf-8"?>
 <p1510:revInfo xmlns:a="http://schemas.openxmlformats.org/drawingml/2006/main" xmlns:r="http://schemas.openxmlformats.org/officeDocument/2006/relationships" xmlns:p1510="http://schemas.microsoft.com/office/powerpoint/2015/10/main">
   <p1510:revLst>
-    <p1510:client id="{738CC137-F84D-1E48-BC87-6B5BA565B657}" v="62" dt="2025-10-13T01:17:22.101"/>
+    <p1510:client id="{738CC137-F84D-1E48-BC87-6B5BA565B657}" v="66" dt="2025-10-20T14:02:50.045"/>
   </p1510:revLst>
 </p1510:revInfo>
 </file>
@@ -55,7 +55,7 @@
   <pc:docChgLst>
     <pc:chgData name="Carroll, Claudia" userId="5513adb2-3315-47c6-853b-61e74126e783" providerId="ADAL" clId="{FDB037B5-BC6E-529D-920A-0733451977A9}"/>
     <pc:docChg chg="undo custSel addSld delSld modSld">
-      <pc:chgData name="Carroll, Claudia" userId="5513adb2-3315-47c6-853b-61e74126e783" providerId="ADAL" clId="{FDB037B5-BC6E-529D-920A-0733451977A9}" dt="2025-10-13T01:18:08.971" v="3013" actId="5793"/>
+      <pc:chgData name="Carroll, Claudia" userId="5513adb2-3315-47c6-853b-61e74126e783" providerId="ADAL" clId="{FDB037B5-BC6E-529D-920A-0733451977A9}" dt="2025-10-20T14:02:39.369" v="3016" actId="1076"/>
       <pc:docMkLst>
         <pc:docMk/>
       </pc:docMkLst>
@@ -255,14 +255,6 @@
           </ac:picMkLst>
         </pc:picChg>
         <pc:picChg chg="add mod">
-          <ac:chgData name="Carroll, Claudia" userId="5513adb2-3315-47c6-853b-61e74126e783" providerId="ADAL" clId="{FDB037B5-BC6E-529D-920A-0733451977A9}" dt="2025-10-13T01:13:39.311" v="2577" actId="1076"/>
-          <ac:picMkLst>
-            <pc:docMk/>
-            <pc:sldMk cId="2949485301" sldId="350"/>
-            <ac:picMk id="1028" creationId="{4B5B3AA1-8155-9D73-FE35-854E5C2E7828}"/>
-          </ac:picMkLst>
-        </pc:picChg>
-        <pc:picChg chg="add mod">
           <ac:chgData name="Carroll, Claudia" userId="5513adb2-3315-47c6-853b-61e74126e783" providerId="ADAL" clId="{FDB037B5-BC6E-529D-920A-0733451977A9}" dt="2025-10-13T01:17:22.101" v="3006" actId="1076"/>
           <ac:picMkLst>
             <pc:docMk/>
@@ -279,13 +271,21 @@
         </pc:sldMkLst>
       </pc:sldChg>
       <pc:sldChg chg="modSp add mod">
-        <pc:chgData name="Carroll, Claudia" userId="5513adb2-3315-47c6-853b-61e74126e783" providerId="ADAL" clId="{FDB037B5-BC6E-529D-920A-0733451977A9}" dt="2025-10-13T01:18:08.971" v="3013" actId="5793"/>
+        <pc:chgData name="Carroll, Claudia" userId="5513adb2-3315-47c6-853b-61e74126e783" providerId="ADAL" clId="{FDB037B5-BC6E-529D-920A-0733451977A9}" dt="2025-10-20T14:02:39.369" v="3016" actId="1076"/>
         <pc:sldMkLst>
           <pc:docMk/>
           <pc:sldMk cId="2903529888" sldId="354"/>
         </pc:sldMkLst>
         <pc:spChg chg="mod">
-          <ac:chgData name="Carroll, Claudia" userId="5513adb2-3315-47c6-853b-61e74126e783" providerId="ADAL" clId="{FDB037B5-BC6E-529D-920A-0733451977A9}" dt="2025-10-13T01:18:08.971" v="3013" actId="5793"/>
+          <ac:chgData name="Carroll, Claudia" userId="5513adb2-3315-47c6-853b-61e74126e783" providerId="ADAL" clId="{FDB037B5-BC6E-529D-920A-0733451977A9}" dt="2025-10-20T14:02:39.369" v="3016" actId="1076"/>
+          <ac:spMkLst>
+            <pc:docMk/>
+            <pc:sldMk cId="2903529888" sldId="354"/>
+            <ac:spMk id="9" creationId="{5072D4C4-1D57-BB4F-A827-ABF24C52AC1D}"/>
+          </ac:spMkLst>
+        </pc:spChg>
+        <pc:spChg chg="mod">
+          <ac:chgData name="Carroll, Claudia" userId="5513adb2-3315-47c6-853b-61e74126e783" providerId="ADAL" clId="{FDB037B5-BC6E-529D-920A-0733451977A9}" dt="2025-10-20T14:02:36.503" v="3015" actId="1076"/>
           <ac:spMkLst>
             <pc:docMk/>
             <pc:sldMk cId="2903529888" sldId="354"/>
@@ -307,14 +307,6 @@
             <ac:spMk id="9" creationId="{07743C90-8058-3FAC-1196-DBEAAA93AD40}"/>
           </ac:spMkLst>
         </pc:spChg>
-        <pc:spChg chg="del">
-          <ac:chgData name="Carroll, Claudia" userId="5513adb2-3315-47c6-853b-61e74126e783" providerId="ADAL" clId="{FDB037B5-BC6E-529D-920A-0733451977A9}" dt="2025-10-13T00:39:57.796" v="398" actId="478"/>
-          <ac:spMkLst>
-            <pc:docMk/>
-            <pc:sldMk cId="3022406172" sldId="355"/>
-            <ac:spMk id="12" creationId="{F5A5C9B6-74A3-70EC-E9F6-20F51452F794}"/>
-          </ac:spMkLst>
-        </pc:spChg>
         <pc:graphicFrameChg chg="add mod modGraphic">
           <ac:chgData name="Carroll, Claudia" userId="5513adb2-3315-47c6-853b-61e74126e783" providerId="ADAL" clId="{FDB037B5-BC6E-529D-920A-0733451977A9}" dt="2025-10-13T00:56:01.353" v="1490"/>
           <ac:graphicFrameMkLst>
@@ -330,22 +322,6 @@
           <pc:docMk/>
           <pc:sldMk cId="1767721028" sldId="356"/>
         </pc:sldMkLst>
-        <pc:spChg chg="mod">
-          <ac:chgData name="Carroll, Claudia" userId="5513adb2-3315-47c6-853b-61e74126e783" providerId="ADAL" clId="{FDB037B5-BC6E-529D-920A-0733451977A9}" dt="2025-10-13T00:57:44.831" v="1507" actId="20577"/>
-          <ac:spMkLst>
-            <pc:docMk/>
-            <pc:sldMk cId="1767721028" sldId="356"/>
-            <ac:spMk id="9" creationId="{550819B1-A186-10F9-A7D8-DBB1CF93FB2F}"/>
-          </ac:spMkLst>
-        </pc:spChg>
-        <pc:graphicFrameChg chg="mod modGraphic">
-          <ac:chgData name="Carroll, Claudia" userId="5513adb2-3315-47c6-853b-61e74126e783" providerId="ADAL" clId="{FDB037B5-BC6E-529D-920A-0733451977A9}" dt="2025-10-13T01:08:15.616" v="2487" actId="14734"/>
-          <ac:graphicFrameMkLst>
-            <pc:docMk/>
-            <pc:sldMk cId="1767721028" sldId="356"/>
-            <ac:graphicFrameMk id="3" creationId="{85E2C686-B3DB-4707-5109-709B8A511BD5}"/>
-          </ac:graphicFrameMkLst>
-        </pc:graphicFrameChg>
       </pc:sldChg>
       <pc:sldChg chg="modSp add mod">
         <pc:chgData name="Carroll, Claudia" userId="5513adb2-3315-47c6-853b-61e74126e783" providerId="ADAL" clId="{FDB037B5-BC6E-529D-920A-0733451977A9}" dt="2025-10-13T01:09:27.756" v="2492" actId="1076"/>
@@ -513,7 +489,7 @@
           <a:p>
             <a:fld id="{1D8BD707-D9CF-40AE-B4C6-C98DA3205C09}" type="datetimeFigureOut">
               <a:rPr lang="en-US"/>
-              <a:t>10/12/25</a:t>
+              <a:t>10/20/25</a:t>
             </a:fld>
             <a:endParaRPr lang="en-US" dirty="0"/>
           </a:p>
@@ -679,7 +655,7 @@
           <a:p>
             <a:fld id="{1D8BD707-D9CF-40AE-B4C6-C98DA3205C09}" type="datetimeFigureOut">
               <a:rPr lang="en-US"/>
-              <a:t>10/12/25</a:t>
+              <a:t>10/20/25</a:t>
             </a:fld>
             <a:endParaRPr lang="en-US" dirty="0"/>
           </a:p>
@@ -888,7 +864,7 @@
           <a:p>
             <a:fld id="{1D8BD707-D9CF-40AE-B4C6-C98DA3205C09}" type="datetimeFigureOut">
               <a:rPr lang="en-US"/>
-              <a:t>10/12/25</a:t>
+              <a:t>10/20/25</a:t>
             </a:fld>
             <a:endParaRPr lang="en-US" dirty="0"/>
           </a:p>
@@ -1031,7 +1007,7 @@
           <a:p>
             <a:fld id="{1D8BD707-D9CF-40AE-B4C6-C98DA3205C09}" type="datetimeFigureOut">
               <a:rPr lang="en-US"/>
-              <a:t>10/12/25</a:t>
+              <a:t>10/20/25</a:t>
             </a:fld>
             <a:endParaRPr lang="en-US" dirty="0"/>
           </a:p>
@@ -1151,7 +1127,7 @@
           <a:p>
             <a:fld id="{1D8BD707-D9CF-40AE-B4C6-C98DA3205C09}" type="datetimeFigureOut">
               <a:rPr lang="en-US"/>
-              <a:t>10/12/25</a:t>
+              <a:t>10/20/25</a:t>
             </a:fld>
             <a:endParaRPr lang="en-US" dirty="0"/>
           </a:p>
@@ -1415,7 +1391,7 @@
           <a:p>
             <a:fld id="{1D8BD707-D9CF-40AE-B4C6-C98DA3205C09}" type="datetimeFigureOut">
               <a:rPr lang="en-US"/>
-              <a:t>10/12/25</a:t>
+              <a:t>10/20/25</a:t>
             </a:fld>
             <a:endParaRPr lang="en-US" dirty="0"/>
           </a:p>
@@ -3456,7 +3432,7 @@
           <a:bodyPr wrap="square" lIns="0" tIns="0" rIns="0" bIns="0" rtlCol="0"/>
           <a:lstStyle/>
           <a:p>
-            <a:endParaRPr dirty="0"/>
+            <a:endParaRPr/>
           </a:p>
         </p:txBody>
       </p:sp>
@@ -3474,7 +3450,7 @@
         </p:nvSpPr>
         <p:spPr>
           <a:xfrm>
-            <a:off x="602891" y="583443"/>
+            <a:off x="621033" y="1344977"/>
             <a:ext cx="15013934" cy="769441"/>
           </a:xfrm>
           <a:prstGeom prst="rect">
@@ -3493,7 +3469,7 @@
           <a:p>
             <a:pPr algn="ctr"/>
             <a:r>
-              <a:rPr lang="en-US" sz="4400" b="1" dirty="0">
+              <a:rPr lang="en-US" sz="4400" b="1">
                 <a:solidFill>
                   <a:srgbClr val="000000"/>
                 </a:solidFill>
@@ -3519,8 +3495,8 @@
         </p:nvSpPr>
         <p:spPr>
           <a:xfrm>
-            <a:off x="602732" y="1823438"/>
-            <a:ext cx="15018112" cy="1938992"/>
+            <a:off x="2602013" y="3522282"/>
+            <a:ext cx="15018112" cy="707886"/>
           </a:xfrm>
           <a:prstGeom prst="rect">
             <a:avLst/>
@@ -3537,37 +3513,16 @@
           <a:lstStyle/>
           <a:p>
             <a:pPr algn="l"/>
-            <a:endParaRPr lang="en-US" sz="4000" dirty="0">
-              <a:solidFill>
-                <a:srgbClr val="000000"/>
-              </a:solidFill>
-              <a:latin typeface="Times New Roman"/>
-              <a:cs typeface="Times New Roman"/>
-            </a:endParaRPr>
-          </a:p>
-          <a:p>
-            <a:pPr marL="457200" indent="-457200" algn="l">
-              <a:buAutoNum type="arabicPeriod"/>
-            </a:pPr>
-            <a:endParaRPr lang="en-US" sz="4000" dirty="0">
-              <a:solidFill>
-                <a:srgbClr val="000000"/>
-              </a:solidFill>
-              <a:latin typeface="Times New Roman"/>
-              <a:cs typeface="Times New Roman"/>
-            </a:endParaRPr>
-          </a:p>
-          <a:p>
-            <a:pPr marL="457200" indent="-457200" algn="l">
-              <a:buAutoNum type="arabicPeriod"/>
-            </a:pPr>
-            <a:endParaRPr lang="en-US" sz="4000" dirty="0">
-              <a:solidFill>
-                <a:srgbClr val="000000"/>
-              </a:solidFill>
-              <a:latin typeface="Times New Roman"/>
-              <a:cs typeface="Times New Roman"/>
-            </a:endParaRPr>
+            <a:r>
+              <a:rPr lang="en-US" sz="4000" dirty="0">
+                <a:solidFill>
+                  <a:srgbClr val="000000"/>
+                </a:solidFill>
+                <a:latin typeface="Times New Roman"/>
+                <a:cs typeface="Times New Roman"/>
+              </a:rPr>
+              <a:t>https://github.com/ClaudiaECarroll/python_data_vis</a:t>
+            </a:r>
           </a:p>
         </p:txBody>
       </p:sp>
@@ -9001,7 +8956,7 @@
           <a:p>
             <a:pPr algn="ctr"/>
             <a:r>
-              <a:rPr lang="en-US" sz="4400" b="1" dirty="0">
+              <a:rPr lang="en-US" sz="4400" b="1">
                 <a:solidFill>
                   <a:srgbClr val="000000"/>
                 </a:solidFill>
@@ -9046,7 +9001,7 @@
           <a:p>
             <a:pPr algn="l"/>
             <a:r>
-              <a:rPr lang="en-US" sz="3200" b="1" dirty="0">
+              <a:rPr lang="en-US" sz="3200" b="1">
                 <a:solidFill>
                   <a:srgbClr val="000000"/>
                 </a:solidFill>
@@ -9058,7 +9013,7 @@
           </a:p>
           <a:p>
             <a:pPr algn="l"/>
-            <a:endParaRPr lang="en-US" sz="3200" b="1" dirty="0">
+            <a:endParaRPr lang="en-US" sz="3200" b="1">
               <a:solidFill>
                 <a:srgbClr val="000000"/>
               </a:solidFill>
@@ -9070,7 +9025,7 @@
             <a:pPr marL="457200" indent="-457200" algn="l">
               <a:buAutoNum type="arabicPeriod"/>
             </a:pPr>
-            <a:endParaRPr lang="en-US" sz="3200" b="1" dirty="0">
+            <a:endParaRPr lang="en-US" sz="3200" b="1">
               <a:solidFill>
                 <a:srgbClr val="000000"/>
               </a:solidFill>
@@ -9082,7 +9037,7 @@
             <a:pPr marL="457200" indent="-457200" algn="l">
               <a:buAutoNum type="arabicPeriod"/>
             </a:pPr>
-            <a:endParaRPr lang="en-US" sz="3200" b="1" dirty="0">
+            <a:endParaRPr lang="en-US" sz="3200" b="1">
               <a:solidFill>
                 <a:srgbClr val="000000"/>
               </a:solidFill>
@@ -9215,7 +9170,7 @@
           <a:lstStyle/>
           <a:p>
             <a:r>
-              <a:rPr lang="en-US" sz="2000" b="1" dirty="0"/>
+              <a:rPr lang="en-US" sz="2000" b="1"/>
               <a:t>Pandas Dataframes:</a:t>
             </a:r>
           </a:p>
@@ -9225,7 +9180,7 @@
               <a:buChar char="•"/>
             </a:pPr>
             <a:r>
-              <a:rPr lang="en-US" sz="2000" dirty="0"/>
+              <a:rPr lang="en-US" sz="2000"/>
               <a:t>Two dimensional</a:t>
             </a:r>
           </a:p>
@@ -9235,7 +9190,7 @@
               <a:buChar char="•"/>
             </a:pPr>
             <a:r>
-              <a:rPr lang="en-US" sz="2000" dirty="0"/>
+              <a:rPr lang="en-US" sz="2000"/>
               <a:t>tabular data structure</a:t>
             </a:r>
           </a:p>
@@ -9245,7 +9200,7 @@
               <a:buChar char="•"/>
             </a:pPr>
             <a:r>
-              <a:rPr lang="en-US" sz="2000" dirty="0"/>
+              <a:rPr lang="en-US" sz="2000"/>
               <a:t>Created by:</a:t>
             </a:r>
           </a:p>
@@ -9255,7 +9210,7 @@
               <a:buChar char="•"/>
             </a:pPr>
             <a:r>
-              <a:rPr lang="en-US" sz="2000" dirty="0"/>
+              <a:rPr lang="en-US" sz="2000"/>
               <a:t>Loading from tabular data file (csv, excel etc.)</a:t>
             </a:r>
           </a:p>
@@ -9265,7 +9220,7 @@
               <a:buChar char="•"/>
             </a:pPr>
             <a:r>
-              <a:rPr lang="en-US" sz="2000" dirty="0"/>
+              <a:rPr lang="en-US" sz="2000"/>
               <a:t>Converting from dictionaries, or combined lists</a:t>
             </a:r>
           </a:p>
@@ -9274,7 +9229,7 @@
               <a:buFont typeface="Arial" panose="020B0604020202020204" pitchFamily="34" charset="0"/>
               <a:buChar char="•"/>
             </a:pPr>
-            <a:endParaRPr lang="en-US" sz="2000" dirty="0"/>
+            <a:endParaRPr lang="en-US" sz="2000"/>
           </a:p>
         </p:txBody>
       </p:sp>
@@ -9307,7 +9262,7 @@
           <a:lstStyle/>
           <a:p>
             <a:r>
-              <a:rPr lang="en-US" sz="2000" b="1" dirty="0"/>
+              <a:rPr lang="en-US" sz="2000" b="1"/>
               <a:t>Pandas Series</a:t>
             </a:r>
           </a:p>
@@ -9317,7 +9272,7 @@
               <a:buChar char="•"/>
             </a:pPr>
             <a:r>
-              <a:rPr lang="en-US" sz="2000" dirty="0"/>
+              <a:rPr lang="en-US" sz="2000"/>
               <a:t>One dimensional (usually one row or column)</a:t>
             </a:r>
           </a:p>
@@ -9327,7 +9282,7 @@
               <a:buChar char="•"/>
             </a:pPr>
             <a:r>
-              <a:rPr lang="en-US" sz="2000" dirty="0"/>
+              <a:rPr lang="en-US" sz="2000"/>
               <a:t>List-type data structure</a:t>
             </a:r>
           </a:p>
@@ -9337,7 +9292,7 @@
               <a:buChar char="•"/>
             </a:pPr>
             <a:r>
-              <a:rPr lang="en-US" sz="2000" dirty="0"/>
+              <a:rPr lang="en-US" sz="2000"/>
               <a:t>Created by slicing a column or row</a:t>
             </a:r>
           </a:p>
@@ -9347,14 +9302,14 @@
               <a:buChar char="•"/>
             </a:pPr>
             <a:r>
-              <a:rPr lang="en-US" sz="2000" dirty="0"/>
+              <a:rPr lang="en-US" sz="2000"/>
               <a:t>Lists or dictionaries are converted to series if added to a </a:t>
             </a:r>
             <a:r>
-              <a:rPr lang="en-US" sz="2000" dirty="0" err="1"/>
+              <a:rPr lang="en-US" sz="2000" err="1"/>
               <a:t>dataframe</a:t>
             </a:r>
-            <a:endParaRPr lang="en-US" sz="2000" dirty="0"/>
+            <a:endParaRPr lang="en-US" sz="2000"/>
           </a:p>
         </p:txBody>
       </p:sp>
@@ -9474,7 +9429,7 @@
           <a:bodyPr wrap="square" lIns="0" tIns="0" rIns="0" bIns="0" rtlCol="0"/>
           <a:lstStyle/>
           <a:p>
-            <a:endParaRPr dirty="0"/>
+            <a:endParaRPr/>
           </a:p>
         </p:txBody>
       </p:sp>
@@ -9511,7 +9466,7 @@
           <a:p>
             <a:pPr algn="ctr"/>
             <a:r>
-              <a:rPr lang="en-US" sz="4400" b="1" dirty="0">
+              <a:rPr lang="en-US" sz="4400" b="1">
                 <a:solidFill>
                   <a:srgbClr val="000000"/>
                 </a:solidFill>
@@ -9593,7 +9548,7 @@
                         <a:defRPr/>
                       </a:pPr>
                       <a:r>
-                        <a:rPr lang="en-US" sz="2000" b="1" dirty="0">
+                        <a:rPr lang="en-US" sz="2000" b="1">
                           <a:solidFill>
                             <a:sysClr val="windowText" lastClr="000000"/>
                           </a:solidFill>
@@ -9675,7 +9630,7 @@
                         <a:defRPr/>
                       </a:pPr>
                       <a:r>
-                        <a:rPr lang="en-US" sz="2000" b="0" dirty="0">
+                        <a:rPr lang="en-US" sz="2000" b="0">
                           <a:solidFill>
                             <a:sysClr val="windowText" lastClr="000000"/>
                           </a:solidFill>
@@ -9764,7 +9719,7 @@
                         <a:defRPr/>
                       </a:pPr>
                       <a:r>
-                        <a:rPr lang="en-US" sz="2000" b="1" dirty="0">
+                        <a:rPr lang="en-US" sz="2000" b="1">
                           <a:solidFill>
                             <a:sysClr val="windowText" lastClr="000000"/>
                           </a:solidFill>
@@ -9846,7 +9801,7 @@
                         <a:defRPr/>
                       </a:pPr>
                       <a:r>
-                        <a:rPr lang="en-US" sz="2000" b="0" dirty="0">
+                        <a:rPr lang="en-US" sz="2000" b="0">
                           <a:solidFill>
                             <a:sysClr val="windowText" lastClr="000000"/>
                           </a:solidFill>
@@ -9935,7 +9890,7 @@
                         <a:defRPr/>
                       </a:pPr>
                       <a:r>
-                        <a:rPr lang="en-US" sz="2000" b="1" dirty="0">
+                        <a:rPr lang="en-US" sz="2000" b="1">
                           <a:solidFill>
                             <a:sysClr val="windowText" lastClr="000000"/>
                           </a:solidFill>
@@ -10017,7 +9972,7 @@
                         <a:defRPr/>
                       </a:pPr>
                       <a:r>
-                        <a:rPr lang="en-US" sz="2000" b="0" dirty="0">
+                        <a:rPr lang="en-US" sz="2000" b="0">
                           <a:solidFill>
                             <a:sysClr val="windowText" lastClr="000000"/>
                           </a:solidFill>
@@ -10106,7 +10061,7 @@
                         <a:defRPr/>
                       </a:pPr>
                       <a:r>
-                        <a:rPr lang="en-US" sz="2000" b="1" dirty="0">
+                        <a:rPr lang="en-US" sz="2000" b="1">
                           <a:solidFill>
                             <a:sysClr val="windowText" lastClr="000000"/>
                           </a:solidFill>
@@ -10188,7 +10143,7 @@
                         <a:defRPr/>
                       </a:pPr>
                       <a:r>
-                        <a:rPr lang="en-US" sz="2000" b="0" dirty="0">
+                        <a:rPr lang="en-US" sz="2000" b="0">
                           <a:solidFill>
                             <a:sysClr val="windowText" lastClr="000000"/>
                           </a:solidFill>
@@ -10260,7 +10215,7 @@
                     <a:lstStyle/>
                     <a:p>
                       <a:r>
-                        <a:rPr lang="en-US" sz="2000" b="1" dirty="0">
+                        <a:rPr lang="en-US" sz="2000" b="1">
                           <a:solidFill>
                             <a:sysClr val="windowText" lastClr="000000"/>
                           </a:solidFill>
@@ -10342,7 +10297,7 @@
                         <a:defRPr/>
                       </a:pPr>
                       <a:r>
-                        <a:rPr lang="en-US" sz="2000" b="0" dirty="0">
+                        <a:rPr lang="en-US" sz="2000" b="0">
                           <a:solidFill>
                             <a:sysClr val="windowText" lastClr="000000"/>
                           </a:solidFill>
@@ -10431,7 +10386,7 @@
                         <a:defRPr/>
                       </a:pPr>
                       <a:r>
-                        <a:rPr lang="en-US" sz="2000" b="1" dirty="0">
+                        <a:rPr lang="en-US" sz="2000" b="1">
                           <a:solidFill>
                             <a:sysClr val="windowText" lastClr="000000"/>
                           </a:solidFill>
@@ -10513,7 +10468,7 @@
                         <a:defRPr/>
                       </a:pPr>
                       <a:r>
-                        <a:rPr lang="en-US" sz="2000" b="0" dirty="0">
+                        <a:rPr lang="en-US" sz="2000" b="0">
                           <a:solidFill>
                             <a:sysClr val="windowText" lastClr="000000"/>
                           </a:solidFill>
@@ -10602,7 +10557,7 @@
                         <a:defRPr/>
                       </a:pPr>
                       <a:r>
-                        <a:rPr lang="en-US" sz="2000" b="1" dirty="0">
+                        <a:rPr lang="en-US" sz="2000" b="1">
                           <a:solidFill>
                             <a:sysClr val="windowText" lastClr="000000"/>
                           </a:solidFill>
@@ -10667,7 +10622,7 @@
                     <a:lstStyle/>
                     <a:p>
                       <a:r>
-                        <a:rPr lang="en-US" sz="2000" b="0" dirty="0">
+                        <a:rPr lang="en-US" sz="2000" b="0">
                           <a:solidFill>
                             <a:sysClr val="windowText" lastClr="000000"/>
                           </a:solidFill>
@@ -10756,7 +10711,7 @@
                         <a:defRPr/>
                       </a:pPr>
                       <a:r>
-                        <a:rPr lang="en-US" sz="2000" b="1" dirty="0">
+                        <a:rPr lang="en-US" sz="2000" b="1">
                           <a:solidFill>
                             <a:sysClr val="windowText" lastClr="000000"/>
                           </a:solidFill>
@@ -10821,7 +10776,7 @@
                     <a:lstStyle/>
                     <a:p>
                       <a:r>
-                        <a:rPr lang="en-US" sz="2000" b="0" dirty="0">
+                        <a:rPr lang="en-US" sz="2000" b="0">
                           <a:solidFill>
                             <a:sysClr val="windowText" lastClr="000000"/>
                           </a:solidFill>
@@ -10910,7 +10865,7 @@
                         <a:defRPr/>
                       </a:pPr>
                       <a:r>
-                        <a:rPr lang="en-US" sz="2000" b="1" dirty="0">
+                        <a:rPr lang="en-US" sz="2000" b="1">
                           <a:solidFill>
                             <a:sysClr val="windowText" lastClr="000000"/>
                           </a:solidFill>
@@ -10975,7 +10930,7 @@
                     <a:lstStyle/>
                     <a:p>
                       <a:r>
-                        <a:rPr lang="en-US" sz="2000" b="0" dirty="0">
+                        <a:rPr lang="en-US" sz="2000" b="0">
                           <a:solidFill>
                             <a:sysClr val="windowText" lastClr="000000"/>
                           </a:solidFill>
@@ -11064,7 +11019,7 @@
                         <a:defRPr/>
                       </a:pPr>
                       <a:r>
-                        <a:rPr lang="en-US" sz="2000" b="1" dirty="0">
+                        <a:rPr lang="en-US" sz="2000" b="1">
                           <a:solidFill>
                             <a:sysClr val="windowText" lastClr="000000"/>
                           </a:solidFill>
@@ -11129,7 +11084,7 @@
                     <a:lstStyle/>
                     <a:p>
                       <a:r>
-                        <a:rPr lang="en-US" sz="2000" b="0" dirty="0">
+                        <a:rPr lang="en-US" sz="2000" b="0">
                           <a:solidFill>
                             <a:sysClr val="windowText" lastClr="000000"/>
                           </a:solidFill>
@@ -11314,7 +11269,7 @@
           <a:bodyPr wrap="square" lIns="0" tIns="0" rIns="0" bIns="0" rtlCol="0"/>
           <a:lstStyle/>
           <a:p>
-            <a:endParaRPr dirty="0"/>
+            <a:endParaRPr/>
           </a:p>
         </p:txBody>
       </p:sp>
@@ -11351,7 +11306,7 @@
           <a:p>
             <a:pPr algn="ctr"/>
             <a:r>
-              <a:rPr lang="en-US" sz="4400" b="1" dirty="0">
+              <a:rPr lang="en-US" sz="4400" b="1">
                 <a:solidFill>
                   <a:srgbClr val="000000"/>
                 </a:solidFill>
@@ -11427,7 +11382,7 @@
                         <a:defRPr/>
                       </a:pPr>
                       <a:r>
-                        <a:rPr lang="en-US" sz="2000" b="1" dirty="0">
+                        <a:rPr lang="en-US" sz="2000" b="1">
                           <a:solidFill>
                             <a:schemeClr val="tx1"/>
                           </a:solidFill>
@@ -11509,7 +11464,7 @@
                         <a:defRPr/>
                       </a:pPr>
                       <a:r>
-                        <a:rPr lang="en-US" sz="2000" b="0" dirty="0" err="1">
+                        <a:rPr lang="en-US" sz="2000" b="0" err="1">
                           <a:solidFill>
                             <a:schemeClr val="tx1"/>
                           </a:solidFill>
@@ -11519,7 +11474,7 @@
                         <a:t>df.duplicated</a:t>
                       </a:r>
                       <a:r>
-                        <a:rPr lang="en-US" sz="2000" b="0" dirty="0">
+                        <a:rPr lang="en-US" sz="2000" b="0">
                           <a:solidFill>
                             <a:schemeClr val="tx1"/>
                           </a:solidFill>
@@ -11608,7 +11563,7 @@
                         <a:defRPr/>
                       </a:pPr>
                       <a:r>
-                        <a:rPr lang="en-US" sz="2000" b="1" dirty="0">
+                        <a:rPr lang="en-US" sz="2000" b="1">
                           <a:solidFill>
                             <a:schemeClr val="tx1"/>
                           </a:solidFill>
@@ -11690,7 +11645,7 @@
                         <a:defRPr/>
                       </a:pPr>
                       <a:r>
-                        <a:rPr lang="en-US" sz="2000" b="0" dirty="0" err="1">
+                        <a:rPr lang="en-US" sz="2000" b="0" err="1">
                           <a:solidFill>
                             <a:schemeClr val="tx1"/>
                           </a:solidFill>
@@ -11699,7 +11654,7 @@
                         </a:rPr>
                         <a:t>df.drop_duplicates</a:t>
                       </a:r>
-                      <a:endParaRPr lang="en-US" sz="2000" b="0" dirty="0">
+                      <a:endParaRPr lang="en-US" sz="2000" b="0">
                         <a:solidFill>
                           <a:schemeClr val="tx1"/>
                         </a:solidFill>
@@ -11786,7 +11741,7 @@
                         <a:defRPr/>
                       </a:pPr>
                       <a:r>
-                        <a:rPr lang="en-US" sz="2000" b="1" dirty="0">
+                        <a:rPr lang="en-US" sz="2000" b="1">
                           <a:solidFill>
                             <a:schemeClr val="tx1"/>
                           </a:solidFill>
@@ -11796,7 +11751,7 @@
                         <a:t>Sort </a:t>
                       </a:r>
                       <a:r>
-                        <a:rPr lang="en-US" sz="2000" b="1" dirty="0" err="1">
+                        <a:rPr lang="en-US" sz="2000" b="1" err="1">
                           <a:solidFill>
                             <a:schemeClr val="tx1"/>
                           </a:solidFill>
@@ -11806,7 +11761,7 @@
                         <a:t>dataframe</a:t>
                       </a:r>
                       <a:r>
-                        <a:rPr lang="en-US" sz="2000" b="1" dirty="0">
+                        <a:rPr lang="en-US" sz="2000" b="1">
                           <a:solidFill>
                             <a:schemeClr val="tx1"/>
                           </a:solidFill>
@@ -11888,7 +11843,7 @@
                         <a:defRPr/>
                       </a:pPr>
                       <a:r>
-                        <a:rPr lang="en-US" sz="2000" b="0" dirty="0" err="1">
+                        <a:rPr lang="en-US" sz="2000" b="0" err="1">
                           <a:solidFill>
                             <a:schemeClr val="tx1"/>
                           </a:solidFill>
@@ -11898,7 +11853,7 @@
                         <a:t>df.sort_values</a:t>
                       </a:r>
                       <a:r>
-                        <a:rPr lang="en-US" sz="2000" b="0" dirty="0">
+                        <a:rPr lang="en-US" sz="2000" b="0">
                           <a:solidFill>
                             <a:schemeClr val="tx1"/>
                           </a:solidFill>
@@ -11987,7 +11942,7 @@
                         <a:defRPr/>
                       </a:pPr>
                       <a:r>
-                        <a:rPr lang="en-US" sz="2000" b="1" dirty="0">
+                        <a:rPr lang="en-US" sz="2000" b="1">
                           <a:solidFill>
                             <a:schemeClr val="tx1"/>
                           </a:solidFill>
@@ -12069,7 +12024,7 @@
                         <a:defRPr/>
                       </a:pPr>
                       <a:r>
-                        <a:rPr lang="en-US" sz="2000" b="0" dirty="0" err="1">
+                        <a:rPr lang="en-US" sz="2000" b="0" err="1">
                           <a:solidFill>
                             <a:schemeClr val="tx1"/>
                           </a:solidFill>
@@ -12079,7 +12034,7 @@
                         <a:t>X.string.lower</a:t>
                       </a:r>
                       <a:r>
-                        <a:rPr lang="en-US" sz="2000" b="0" dirty="0">
+                        <a:rPr lang="en-US" sz="2000" b="0">
                           <a:solidFill>
                             <a:schemeClr val="tx1"/>
                           </a:solidFill>
@@ -12089,7 +12044,7 @@
                         <a:t>() and </a:t>
                       </a:r>
                       <a:r>
-                        <a:rPr lang="en-US" sz="2000" b="0" dirty="0" err="1">
+                        <a:rPr lang="en-US" sz="2000" b="0" err="1">
                           <a:solidFill>
                             <a:schemeClr val="tx1"/>
                           </a:solidFill>
@@ -12099,7 +12054,7 @@
                         <a:t>X.string.upper</a:t>
                       </a:r>
                       <a:r>
-                        <a:rPr lang="en-US" sz="2000" b="0" dirty="0">
+                        <a:rPr lang="en-US" sz="2000" b="0">
                           <a:solidFill>
                             <a:schemeClr val="tx1"/>
                           </a:solidFill>
@@ -12171,7 +12126,7 @@
                     <a:lstStyle/>
                     <a:p>
                       <a:r>
-                        <a:rPr lang="en-US" sz="2000" b="1" dirty="0">
+                        <a:rPr lang="en-US" sz="2000" b="1">
                           <a:solidFill>
                             <a:schemeClr val="tx1"/>
                           </a:solidFill>
@@ -12253,7 +12208,7 @@
                         <a:defRPr/>
                       </a:pPr>
                       <a:r>
-                        <a:rPr lang="en-US" sz="2000" b="0" dirty="0" err="1">
+                        <a:rPr lang="en-US" sz="2000" b="0" err="1">
                           <a:solidFill>
                             <a:schemeClr val="tx1"/>
                           </a:solidFill>
@@ -12263,7 +12218,7 @@
                         <a:t>X.replace</a:t>
                       </a:r>
                       <a:r>
-                        <a:rPr lang="en-US" sz="2000" b="0" dirty="0">
+                        <a:rPr lang="en-US" sz="2000" b="0">
                           <a:solidFill>
                             <a:schemeClr val="tx1"/>
                           </a:solidFill>
@@ -12352,7 +12307,7 @@
                         <a:defRPr/>
                       </a:pPr>
                       <a:r>
-                        <a:rPr lang="en-US" sz="2000" b="1" dirty="0">
+                        <a:rPr lang="en-US" sz="2000" b="1">
                           <a:solidFill>
                             <a:schemeClr val="tx1"/>
                           </a:solidFill>
@@ -12434,7 +12389,7 @@
                         <a:defRPr/>
                       </a:pPr>
                       <a:r>
-                        <a:rPr lang="en-US" sz="2000" b="0" dirty="0" err="1">
+                        <a:rPr lang="en-US" sz="2000" b="0" err="1">
                           <a:solidFill>
                             <a:schemeClr val="tx1"/>
                           </a:solidFill>
@@ -12444,7 +12399,7 @@
                         <a:t>df.rename</a:t>
                       </a:r>
                       <a:r>
-                        <a:rPr lang="en-US" sz="2000" b="0" dirty="0">
+                        <a:rPr lang="en-US" sz="2000" b="0">
                           <a:solidFill>
                             <a:schemeClr val="tx1"/>
                           </a:solidFill>
@@ -12533,7 +12488,7 @@
                         <a:defRPr/>
                       </a:pPr>
                       <a:r>
-                        <a:rPr lang="en-US" sz="2000" b="1" dirty="0">
+                        <a:rPr lang="en-US" sz="2000" b="1">
                           <a:solidFill>
                             <a:schemeClr val="tx1"/>
                           </a:solidFill>
@@ -12598,7 +12553,7 @@
                     <a:lstStyle/>
                     <a:p>
                       <a:r>
-                        <a:rPr lang="en-US" sz="2000" b="0" dirty="0" err="1">
+                        <a:rPr lang="en-US" sz="2000" b="0" err="1">
                           <a:solidFill>
                             <a:schemeClr val="tx1"/>
                           </a:solidFill>
@@ -12608,7 +12563,7 @@
                         <a:t>isna</a:t>
                       </a:r>
                       <a:r>
-                        <a:rPr lang="en-US" sz="2000" b="0" dirty="0">
+                        <a:rPr lang="en-US" sz="2000" b="0">
                           <a:solidFill>
                             <a:schemeClr val="tx1"/>
                           </a:solidFill>
@@ -12697,7 +12652,7 @@
                         <a:defRPr/>
                       </a:pPr>
                       <a:r>
-                        <a:rPr lang="en-US" sz="2000" b="1" dirty="0">
+                        <a:rPr lang="en-US" sz="2000" b="1">
                           <a:solidFill>
                             <a:schemeClr val="tx1"/>
                           </a:solidFill>
@@ -12762,7 +12717,7 @@
                     <a:lstStyle/>
                     <a:p>
                       <a:r>
-                        <a:rPr lang="en-US" sz="2000" b="0" dirty="0" err="1">
+                        <a:rPr lang="en-US" sz="2000" b="0" err="1">
                           <a:solidFill>
                             <a:schemeClr val="tx1"/>
                           </a:solidFill>
@@ -12772,7 +12727,7 @@
                         <a:t>notna</a:t>
                       </a:r>
                       <a:r>
-                        <a:rPr lang="en-US" sz="2000" b="0" dirty="0">
+                        <a:rPr lang="en-US" sz="2000" b="0">
                           <a:solidFill>
                             <a:schemeClr val="tx1"/>
                           </a:solidFill>
@@ -12861,7 +12816,7 @@
                         <a:defRPr/>
                       </a:pPr>
                       <a:r>
-                        <a:rPr lang="en-US" sz="2000" b="1" dirty="0">
+                        <a:rPr lang="en-US" sz="2000" b="1">
                           <a:solidFill>
                             <a:schemeClr val="tx1"/>
                           </a:solidFill>
@@ -12926,7 +12881,7 @@
                     <a:lstStyle/>
                     <a:p>
                       <a:r>
-                        <a:rPr lang="en-US" sz="2000" b="0" dirty="0" err="1">
+                        <a:rPr lang="en-US" sz="2000" b="0" err="1">
                           <a:solidFill>
                             <a:schemeClr val="tx1"/>
                           </a:solidFill>
@@ -12936,7 +12891,7 @@
                         <a:t>dropna</a:t>
                       </a:r>
                       <a:r>
-                        <a:rPr lang="en-US" sz="2000" b="0" dirty="0">
+                        <a:rPr lang="en-US" sz="2000" b="0">
                           <a:solidFill>
                             <a:schemeClr val="tx1"/>
                           </a:solidFill>

</xml_diff>